<commit_message>
Remove broken footer from poster
</commit_message>
<xml_diff>
--- a/doc/Poster.pptx
+++ b/doc/Poster.pptx
@@ -115,7 +115,7 @@
   </p:defaultTextStyle>
   <p:extLst>
     <p:ext uri="{EFAFB233-063F-42B5-8137-9DF3F51BA10A}">
-      <p15:sldGuideLst xmlns:p15="http://schemas.microsoft.com/office/powerpoint/2012/main">
+      <p15:sldGuideLst xmlns:p15="http://schemas.microsoft.com/office/powerpoint/2012/main" xmlns="">
         <p15:guide id="1" orient="horz" pos="1225">
           <p15:clr>
             <a:srgbClr val="A4A3A4"/>
@@ -134,7 +134,7 @@
       </p15:sldGuideLst>
     </p:ext>
     <p:ext uri="{2D200454-40CA-4A62-9FC3-DE9A4176ACB9}">
-      <p15:notesGuideLst xmlns:p15="http://schemas.microsoft.com/office/powerpoint/2012/main">
+      <p15:notesGuideLst xmlns:p15="http://schemas.microsoft.com/office/powerpoint/2012/main" xmlns="">
         <p15:guide id="1" orient="horz" pos="2880">
           <p15:clr>
             <a:srgbClr val="A4A3A4"/>
@@ -234,7 +234,7 @@
             <a:fld id="{C7CAD782-B485-49B5-A3BD-4E6E393EC598}" type="datetimeFigureOut">
               <a:rPr lang="de-DE" smtClean="0"/>
               <a:pPr/>
-              <a:t>04.02.19</a:t>
+              <a:t>08.02.2019</a:t>
             </a:fld>
             <a:endParaRPr lang="de-DE"/>
           </a:p>
@@ -301,7 +301,7 @@
             <a:fld id="{5603FE17-E0DE-4727-8D0D-916DAE0CA91D}" type="slidenum">
               <a:rPr lang="de-DE" smtClean="0"/>
               <a:pPr/>
-              <a:t>‹#›</a:t>
+              <a:t>‹Nr.›</a:t>
             </a:fld>
             <a:endParaRPr lang="de-DE"/>
           </a:p>
@@ -401,7 +401,7 @@
             <a:fld id="{8979F83A-785F-4360-A784-5014DB85EF80}" type="datetimeFigureOut">
               <a:rPr lang="de-DE" smtClean="0"/>
               <a:pPr/>
-              <a:t>04.02.19</a:t>
+              <a:t>08.02.2019</a:t>
             </a:fld>
             <a:endParaRPr lang="de-DE"/>
           </a:p>
@@ -562,7 +562,7 @@
             <a:fld id="{0800A50D-30E1-41BB-BFC2-D3D818AB8EF9}" type="slidenum">
               <a:rPr lang="de-DE" smtClean="0"/>
               <a:pPr/>
-              <a:t>‹#›</a:t>
+              <a:t>‹Nr.›</a:t>
             </a:fld>
             <a:endParaRPr lang="de-DE"/>
           </a:p>
@@ -975,9 +975,17 @@
             <a:endParaRPr lang="de-DE" dirty="0"/>
           </a:p>
           <a:p>
+            <a:r>
+              <a:rPr lang="de-DE" dirty="0"/>
+              <a:t/>
+            </a:r>
             <a:br>
               <a:rPr lang="de-DE" dirty="0"/>
             </a:br>
+            <a:r>
+              <a:rPr lang="de-DE" dirty="0"/>
+              <a:t/>
+            </a:r>
             <a:br>
               <a:rPr lang="de-DE" dirty="0"/>
             </a:br>
@@ -994,6 +1002,10 @@
           </a:p>
           <a:p>
             <a:pPr lvl="1"/>
+            <a:r>
+              <a:rPr lang="de-DE" dirty="0"/>
+              <a:t/>
+            </a:r>
             <a:br>
               <a:rPr lang="de-DE" dirty="0"/>
             </a:br>
@@ -2082,6 +2094,10 @@
           </a:p>
           <a:p>
             <a:pPr lvl="1"/>
+            <a:r>
+              <a:rPr lang="de-DE" dirty="0"/>
+              <a:t/>
+            </a:r>
             <a:br>
               <a:rPr lang="de-DE" dirty="0"/>
             </a:br>
@@ -3834,9 +3850,17 @@
             <a:endParaRPr lang="de-DE" dirty="0"/>
           </a:p>
           <a:p>
+            <a:r>
+              <a:rPr lang="de-DE" dirty="0"/>
+              <a:t/>
+            </a:r>
             <a:br>
               <a:rPr lang="de-DE" dirty="0"/>
             </a:br>
+            <a:r>
+              <a:rPr lang="de-DE" dirty="0"/>
+              <a:t/>
+            </a:r>
             <a:br>
               <a:rPr lang="de-DE" dirty="0"/>
             </a:br>
@@ -3853,6 +3877,10 @@
           </a:p>
           <a:p>
             <a:pPr lvl="1"/>
+            <a:r>
+              <a:rPr lang="de-DE" dirty="0"/>
+              <a:t/>
+            </a:r>
             <a:br>
               <a:rPr lang="de-DE" dirty="0"/>
             </a:br>
@@ -4944,6 +4972,10 @@
           </a:p>
           <a:p>
             <a:pPr lvl="1"/>
+            <a:r>
+              <a:rPr lang="de-DE" dirty="0"/>
+              <a:t/>
+            </a:r>
             <a:br>
               <a:rPr lang="de-DE" dirty="0"/>
             </a:br>
@@ -5717,6 +5749,13 @@
   <p:clrMapOvr>
     <a:masterClrMapping/>
   </p:clrMapOvr>
+  <p:timing>
+    <p:tnLst>
+      <p:par>
+        <p:cTn id="1" dur="indefinite" restart="never" nodeType="tmRoot"/>
+      </p:par>
+    </p:tnLst>
+  </p:timing>
 </p:sldLayout>
 </file>
 
@@ -6231,6 +6270,13 @@
   <p:clrMapOvr>
     <a:masterClrMapping/>
   </p:clrMapOvr>
+  <p:timing>
+    <p:tnLst>
+      <p:par>
+        <p:cTn id="1" dur="indefinite" restart="never" nodeType="tmRoot"/>
+      </p:par>
+    </p:tnLst>
+  </p:timing>
 </p:sldLayout>
 </file>
 
@@ -6397,6 +6443,13 @@
   <p:clrMapOvr>
     <a:masterClrMapping/>
   </p:clrMapOvr>
+  <p:timing>
+    <p:tnLst>
+      <p:par>
+        <p:cTn id="1" dur="indefinite" restart="never" nodeType="tmRoot"/>
+      </p:par>
+    </p:tnLst>
+  </p:timing>
 </p:sldLayout>
 </file>
 
@@ -6711,6 +6764,10 @@
           </a:p>
           <a:p>
             <a:pPr lvl="1"/>
+            <a:r>
+              <a:rPr lang="de-DE" dirty="0"/>
+              <a:t/>
+            </a:r>
             <a:br>
               <a:rPr lang="de-DE" dirty="0"/>
             </a:br>
@@ -8473,9 +8530,17 @@
             <a:endParaRPr lang="de-DE" dirty="0"/>
           </a:p>
           <a:p>
+            <a:r>
+              <a:rPr lang="de-DE" dirty="0"/>
+              <a:t/>
+            </a:r>
             <a:br>
               <a:rPr lang="de-DE" dirty="0"/>
             </a:br>
+            <a:r>
+              <a:rPr lang="de-DE" dirty="0"/>
+              <a:t/>
+            </a:r>
             <a:br>
               <a:rPr lang="de-DE" dirty="0"/>
             </a:br>
@@ -8492,6 +8557,10 @@
           </a:p>
           <a:p>
             <a:pPr lvl="1"/>
+            <a:r>
+              <a:rPr lang="de-DE" dirty="0"/>
+              <a:t/>
+            </a:r>
             <a:br>
               <a:rPr lang="de-DE" dirty="0"/>
             </a:br>
@@ -9580,6 +9649,10 @@
           </a:p>
           <a:p>
             <a:pPr lvl="1"/>
+            <a:r>
+              <a:rPr lang="de-DE" dirty="0"/>
+              <a:t/>
+            </a:r>
             <a:br>
               <a:rPr lang="de-DE" dirty="0"/>
             </a:br>
@@ -11332,9 +11405,17 @@
             <a:endParaRPr lang="de-DE" dirty="0"/>
           </a:p>
           <a:p>
+            <a:r>
+              <a:rPr lang="de-DE" dirty="0"/>
+              <a:t/>
+            </a:r>
             <a:br>
               <a:rPr lang="de-DE" dirty="0"/>
             </a:br>
+            <a:r>
+              <a:rPr lang="de-DE" dirty="0"/>
+              <a:t/>
+            </a:r>
             <a:br>
               <a:rPr lang="de-DE" dirty="0"/>
             </a:br>
@@ -11351,6 +11432,10 @@
           </a:p>
           <a:p>
             <a:pPr lvl="1"/>
+            <a:r>
+              <a:rPr lang="de-DE" dirty="0"/>
+              <a:t/>
+            </a:r>
             <a:br>
               <a:rPr lang="de-DE" dirty="0"/>
             </a:br>
@@ -14180,6 +14265,23 @@
               <a:tabLst/>
               <a:defRPr/>
             </a:pPr>
+            <a:r>
+              <a:rPr kumimoji="0" lang="de-DE" sz="2400" b="0" i="0" u="none" strike="noStrike" kern="1200" cap="none" spc="0" normalizeH="0" baseline="0" noProof="0" dirty="0">
+                <a:ln>
+                  <a:noFill/>
+                </a:ln>
+                <a:solidFill>
+                  <a:srgbClr val="0071BB"/>
+                </a:solidFill>
+                <a:effectLst/>
+                <a:uLnTx/>
+                <a:uFillTx/>
+                <a:latin typeface="Arial"/>
+                <a:ea typeface="+mj-ea"/>
+                <a:cs typeface="Arial" pitchFamily="34" charset="0"/>
+              </a:rPr>
+              <a:t/>
+            </a:r>
             <a:br>
               <a:rPr kumimoji="0" lang="de-DE" sz="2400" b="0" i="0" u="none" strike="noStrike" kern="1200" cap="none" spc="0" normalizeH="0" baseline="0" noProof="0" dirty="0">
                 <a:ln>
@@ -14906,8 +15008,8 @@
           <a:chExt cx="0" cy="0"/>
         </a:xfrm>
       </p:grpSpPr>
-      <mc:AlternateContent xmlns:mc="http://schemas.openxmlformats.org/markup-compatibility/2006" xmlns:a14="http://schemas.microsoft.com/office/drawing/2010/main">
-        <mc:Choice Requires="a14">
+      <mc:AlternateContent xmlns:mc="http://schemas.openxmlformats.org/markup-compatibility/2006">
+        <mc:Choice xmlns:a14="http://schemas.microsoft.com/office/drawing/2010/main" Requires="a14">
           <p:sp>
             <p:nvSpPr>
               <p:cNvPr id="5" name="Untertitel 4"/>
@@ -15001,7 +15103,7 @@
                       <m:sSubPr>
                         <m:ctrlPr>
                           <a:rPr lang="de-DE" b="0" i="1" smtClean="0">
-                            <a:latin typeface="Cambria Math" panose="02040503050406030204" pitchFamily="18" charset="0"/>
+                            <a:latin typeface="Cambria Math"/>
                           </a:rPr>
                         </m:ctrlPr>
                       </m:sSubPr>
@@ -15024,7 +15126,13 @@
                           <a:rPr lang="de-DE" b="0" i="1" smtClean="0">
                             <a:latin typeface="Cambria Math" panose="02040503050406030204" pitchFamily="18" charset="0"/>
                           </a:rPr>
-                          <m:t>+1</m:t>
+                          <m:t>+</m:t>
+                        </m:r>
+                        <m:r>
+                          <a:rPr lang="de-DE" b="0" i="1" smtClean="0">
+                            <a:latin typeface="Cambria Math" panose="02040503050406030204" pitchFamily="18" charset="0"/>
+                          </a:rPr>
+                          <m:t>1</m:t>
                         </m:r>
                       </m:sub>
                     </m:sSub>
@@ -15038,7 +15146,7 @@
                       <m:sSubSupPr>
                         <m:ctrlPr>
                           <a:rPr lang="de-DE" b="0" i="1" smtClean="0">
-                            <a:latin typeface="Cambria Math" panose="02040503050406030204" pitchFamily="18" charset="0"/>
+                            <a:latin typeface="Cambria Math"/>
                           </a:rPr>
                         </m:ctrlPr>
                       </m:sSubSupPr>
@@ -15089,7 +15197,7 @@
                       <m:sSubPr>
                         <m:ctrlPr>
                           <a:rPr lang="de-DE" b="0" i="1" smtClean="0">
-                            <a:latin typeface="Cambria Math" panose="02040503050406030204" pitchFamily="18" charset="0"/>
+                            <a:latin typeface="Cambria Math"/>
                           </a:rPr>
                         </m:ctrlPr>
                       </m:sSubPr>
@@ -15114,7 +15222,13 @@
                       <a:rPr lang="de-DE" b="0" i="1" smtClean="0">
                         <a:latin typeface="Cambria Math" panose="02040503050406030204" pitchFamily="18" charset="0"/>
                       </a:rPr>
-                      <m:t>=0</m:t>
+                      <m:t>=</m:t>
+                    </m:r>
+                    <m:r>
+                      <a:rPr lang="de-DE" b="0" i="1" smtClean="0">
+                        <a:latin typeface="Cambria Math" panose="02040503050406030204" pitchFamily="18" charset="0"/>
+                      </a:rPr>
+                      <m:t>0</m:t>
                     </m:r>
                   </m:oMath>
                 </a14:m>
@@ -15150,7 +15264,7 @@
                       <m:limLowPr>
                         <m:ctrlPr>
                           <a:rPr lang="de-DE" b="0" i="1" smtClean="0">
-                            <a:latin typeface="Cambria Math" panose="02040503050406030204" pitchFamily="18" charset="0"/>
+                            <a:latin typeface="Cambria Math"/>
                           </a:rPr>
                         </m:ctrlPr>
                       </m:limLowPr>
@@ -15190,7 +15304,7 @@
                       <m:sSubPr>
                         <m:ctrlPr>
                           <a:rPr lang="de-DE" b="0" i="1" smtClean="0">
-                            <a:latin typeface="Cambria Math" panose="02040503050406030204" pitchFamily="18" charset="0"/>
+                            <a:latin typeface="Cambria Math"/>
                           </a:rPr>
                         </m:ctrlPr>
                       </m:sSubPr>
@@ -15272,20 +15386,24 @@
                   <a:rPr lang="de-DE" b="1" dirty="0" err="1"/>
                   <a:t>OpenMP</a:t>
                 </a:r>
+                <a:r>
+                  <a:rPr lang="de-DE" b="1" dirty="0"/>
+                  <a:t/>
+                </a:r>
                 <a:br>
                   <a:rPr lang="de-DE" b="1" dirty="0"/>
                 </a:br>
                 <a:r>
                   <a:rPr lang="de-DE" dirty="0"/>
-                  <a:t>OpenMP2 (Open Multi-Processing) ist ein API, das auf die Parallelisierung von Schlei- </a:t>
+                  <a:t>OpenMP2 (Open Multi-Processing) ist ein API, das auf die Parallelisierung von </a:t>
                 </a:r>
                 <a:r>
-                  <a:rPr lang="de-DE" dirty="0" err="1"/>
-                  <a:t>fen</a:t>
+                  <a:rPr lang="de-DE" dirty="0" smtClean="0"/>
+                  <a:t>Schleifen </a:t>
                 </a:r>
                 <a:r>
                   <a:rPr lang="de-DE" dirty="0"/>
-                  <a:t> und Programmabschnitten auf </a:t>
+                  <a:t>und Programmabschnitten auf </a:t>
                 </a:r>
                 <a:r>
                   <a:rPr lang="de-DE" dirty="0" err="1"/>
@@ -15293,8 +15411,13 @@
                 </a:r>
                 <a:r>
                   <a:rPr lang="de-DE" dirty="0"/>
-                  <a:t> Memory Systemen spezialisiert ist </a:t>
+                  <a:t> Memory Systemen spezialisiert </a:t>
                 </a:r>
+                <a:r>
+                  <a:rPr lang="de-DE" dirty="0" smtClean="0"/>
+                  <a:t>ist.</a:t>
+                </a:r>
+                <a:endParaRPr lang="de-DE" dirty="0"/>
               </a:p>
               <a:p>
                 <a:r>
@@ -15434,6 +15557,10 @@
                 <a:r>
                   <a:rPr lang="de-DE" b="1" dirty="0" err="1"/>
                   <a:t>Lastbalancierung</a:t>
+                </a:r>
+                <a:r>
+                  <a:rPr lang="de-DE" b="1" dirty="0"/>
+                  <a:t/>
                 </a:r>
                 <a:br>
                   <a:rPr lang="de-DE" b="1" dirty="0"/>
@@ -15598,7 +15725,7 @@
             </p:txBody>
           </p:sp>
         </mc:Choice>
-        <mc:Fallback xmlns="">
+        <mc:Fallback>
           <p:sp>
             <p:nvSpPr>
               <p:cNvPr id="5" name="Untertitel 4"/>
@@ -15610,10 +15737,10 @@
               </p:nvPr>
             </p:nvSpPr>
             <p:spPr>
-              <a:blipFill>
+              <a:blipFill rotWithShape="1">
                 <a:blip r:embed="rId2"/>
                 <a:stretch>
-                  <a:fillRect l="-1060" t="-540" r="-1156"/>
+                  <a:fillRect l="-1064" t="-562" r="-1110"/>
                 </a:stretch>
               </a:blipFill>
             </p:spPr>
@@ -15637,7 +15764,7 @@
           <p:cNvPr id="3" name="Picture Placeholder 2">
             <a:extLst>
               <a:ext uri="{FF2B5EF4-FFF2-40B4-BE49-F238E27FC236}">
-                <a16:creationId xmlns:a16="http://schemas.microsoft.com/office/drawing/2014/main" id="{96B0D0B4-6AAA-1649-B878-404BD5534190}"/>
+                <a16:creationId xmlns:a16="http://schemas.microsoft.com/office/drawing/2014/main" xmlns="" id="{96B0D0B4-6AAA-1649-B878-404BD5534190}"/>
               </a:ext>
             </a:extLst>
           </p:cNvPr>
@@ -15649,7 +15776,7 @@
           </p:nvPr>
         </p:nvPicPr>
         <p:blipFill>
-          <a:blip r:embed="rId3">
+          <a:blip r:embed="rId3" cstate="print">
             <a:extLst>
               <a:ext uri="{28A0092B-C50C-407E-A947-70E740481C1C}">
                 <a14:useLocalDpi xmlns:a14="http://schemas.microsoft.com/office/drawing/2010/main" val="0"/>
@@ -15802,7 +15929,7 @@
           <p:cNvPr id="11" name="Picture 10">
             <a:extLst>
               <a:ext uri="{FF2B5EF4-FFF2-40B4-BE49-F238E27FC236}">
-                <a16:creationId xmlns:a16="http://schemas.microsoft.com/office/drawing/2014/main" id="{A99698A5-1CCE-BE44-BC3A-9B65E65CC1BA}"/>
+                <a16:creationId xmlns:a16="http://schemas.microsoft.com/office/drawing/2014/main" xmlns="" id="{A99698A5-1CCE-BE44-BC3A-9B65E65CC1BA}"/>
               </a:ext>
             </a:extLst>
           </p:cNvPr>
@@ -15812,7 +15939,7 @@
           <p:nvPr/>
         </p:nvPicPr>
         <p:blipFill>
-          <a:blip r:embed="rId4">
+          <a:blip r:embed="rId4" cstate="print">
             <a:extLst>
               <a:ext uri="{28A0092B-C50C-407E-A947-70E740481C1C}">
                 <a14:useLocalDpi xmlns:a14="http://schemas.microsoft.com/office/drawing/2010/main" val="0"/>
@@ -15838,7 +15965,7 @@
           <p:cNvPr id="13" name="Picture 12">
             <a:extLst>
               <a:ext uri="{FF2B5EF4-FFF2-40B4-BE49-F238E27FC236}">
-                <a16:creationId xmlns:a16="http://schemas.microsoft.com/office/drawing/2014/main" id="{A8E92815-BAB8-294B-AF15-1EBADAC251C7}"/>
+                <a16:creationId xmlns:a16="http://schemas.microsoft.com/office/drawing/2014/main" xmlns="" id="{A8E92815-BAB8-294B-AF15-1EBADAC251C7}"/>
               </a:ext>
             </a:extLst>
           </p:cNvPr>
@@ -15848,7 +15975,7 @@
           <p:nvPr/>
         </p:nvPicPr>
         <p:blipFill rotWithShape="1">
-          <a:blip r:embed="rId5">
+          <a:blip r:embed="rId5" cstate="print">
             <a:extLst>
               <a:ext uri="{28A0092B-C50C-407E-A947-70E740481C1C}">
                 <a14:useLocalDpi xmlns:a14="http://schemas.microsoft.com/office/drawing/2010/main" val="0"/>
@@ -15868,11 +15995,64 @@
           </a:prstGeom>
         </p:spPr>
       </p:pic>
+      <p:sp>
+        <p:nvSpPr>
+          <p:cNvPr id="2" name="Rechteck 1"/>
+          <p:cNvSpPr/>
+          <p:nvPr/>
+        </p:nvSpPr>
+        <p:spPr>
+          <a:xfrm>
+            <a:off x="972000" y="19910424"/>
+            <a:ext cx="10910569" cy="864096"/>
+          </a:xfrm>
+          <a:prstGeom prst="rect">
+            <a:avLst/>
+          </a:prstGeom>
+          <a:solidFill>
+            <a:schemeClr val="bg1"/>
+          </a:solidFill>
+          <a:ln>
+            <a:noFill/>
+          </a:ln>
+        </p:spPr>
+        <p:style>
+          <a:lnRef idx="2">
+            <a:schemeClr val="accent1">
+              <a:shade val="50000"/>
+            </a:schemeClr>
+          </a:lnRef>
+          <a:fillRef idx="1">
+            <a:schemeClr val="accent1"/>
+          </a:fillRef>
+          <a:effectRef idx="0">
+            <a:schemeClr val="accent1"/>
+          </a:effectRef>
+          <a:fontRef idx="minor">
+            <a:schemeClr val="lt1"/>
+          </a:fontRef>
+        </p:style>
+        <p:txBody>
+          <a:bodyPr rtlCol="0" anchor="ctr"/>
+          <a:lstStyle/>
+          <a:p>
+            <a:pPr algn="ctr"/>
+            <a:endParaRPr lang="de-DE"/>
+          </a:p>
+        </p:txBody>
+      </p:sp>
     </p:spTree>
   </p:cSld>
   <p:clrMapOvr>
     <a:masterClrMapping/>
   </p:clrMapOvr>
+  <p:timing>
+    <p:tnLst>
+      <p:par>
+        <p:cTn id="1" dur="indefinite" restart="never" nodeType="tmRoot"/>
+      </p:par>
+    </p:tnLst>
+  </p:timing>
 </p:sld>
 </file>
 

</xml_diff>